<commit_message>
Update package.json to use server-v3.js as main entry point
</commit_message>
<xml_diff>
--- a/페이지구성.pptx
+++ b/페이지구성.pptx
@@ -106,7 +106,88 @@
       </a:defRPr>
     </a:lvl9pPr>
   </p:defaultTextStyle>
+  <p:extLst>
+    <p:ext uri="{EFAFB233-063F-42B5-8137-9DF3F51BA10A}">
+      <p15:sldGuideLst xmlns:p15="http://schemas.microsoft.com/office/powerpoint/2012/main"/>
+    </p:ext>
+  </p:extLst>
 </p:presentation>
+</file>
+
+<file path=ppt/changesInfos/changesInfo1.xml><?xml version="1.0" encoding="utf-8"?>
+<pc:chgInfo xmlns:a="http://schemas.openxmlformats.org/drawingml/2006/main" xmlns:r="http://schemas.openxmlformats.org/officeDocument/2006/relationships" xmlns:ac="http://schemas.microsoft.com/office/drawing/2013/main/command" xmlns:pc="http://schemas.microsoft.com/office/powerpoint/2013/main/command">
+  <pc:docChgLst>
+    <pc:chgData name="글론 닥터" userId="b0cac3566cd76970" providerId="LiveId" clId="{F28ECF3E-4BC1-52CB-8BC1-C40AAE8EC184}"/>
+    <pc:docChg chg="modSld">
+      <pc:chgData name="글론 닥터" userId="b0cac3566cd76970" providerId="LiveId" clId="{F28ECF3E-4BC1-52CB-8BC1-C40AAE8EC184}" dt="2025-08-26T13:16:32.524" v="15" actId="20577"/>
+      <pc:docMkLst>
+        <pc:docMk/>
+      </pc:docMkLst>
+      <pc:sldChg chg="modSp mod">
+        <pc:chgData name="글론 닥터" userId="b0cac3566cd76970" providerId="LiveId" clId="{F28ECF3E-4BC1-52CB-8BC1-C40AAE8EC184}" dt="2025-08-26T13:12:30.686" v="7" actId="1076"/>
+        <pc:sldMkLst>
+          <pc:docMk/>
+          <pc:sldMk cId="920679095" sldId="256"/>
+        </pc:sldMkLst>
+        <pc:spChg chg="mod">
+          <ac:chgData name="글론 닥터" userId="b0cac3566cd76970" providerId="LiveId" clId="{F28ECF3E-4BC1-52CB-8BC1-C40AAE8EC184}" dt="2025-08-26T13:12:18.927" v="4" actId="14100"/>
+          <ac:spMkLst>
+            <pc:docMk/>
+            <pc:sldMk cId="920679095" sldId="256"/>
+            <ac:spMk id="4" creationId="{DC6D56FC-7B3F-9207-230D-DBAB51019259}"/>
+          </ac:spMkLst>
+        </pc:spChg>
+        <pc:spChg chg="mod">
+          <ac:chgData name="글론 닥터" userId="b0cac3566cd76970" providerId="LiveId" clId="{F28ECF3E-4BC1-52CB-8BC1-C40AAE8EC184}" dt="2025-08-26T13:12:16.355" v="3" actId="14100"/>
+          <ac:spMkLst>
+            <pc:docMk/>
+            <pc:sldMk cId="920679095" sldId="256"/>
+            <ac:spMk id="5" creationId="{AC1B9E80-1CAF-0C6B-624D-4E32E345ADA0}"/>
+          </ac:spMkLst>
+        </pc:spChg>
+        <pc:spChg chg="mod">
+          <ac:chgData name="글론 닥터" userId="b0cac3566cd76970" providerId="LiveId" clId="{F28ECF3E-4BC1-52CB-8BC1-C40AAE8EC184}" dt="2025-08-26T13:12:22.098" v="5" actId="14100"/>
+          <ac:spMkLst>
+            <pc:docMk/>
+            <pc:sldMk cId="920679095" sldId="256"/>
+            <ac:spMk id="6" creationId="{B676C195-7E34-08F6-E8E3-8790D4084B45}"/>
+          </ac:spMkLst>
+        </pc:spChg>
+        <pc:spChg chg="mod">
+          <ac:chgData name="글론 닥터" userId="b0cac3566cd76970" providerId="LiveId" clId="{F28ECF3E-4BC1-52CB-8BC1-C40AAE8EC184}" dt="2025-08-26T13:12:30.686" v="7" actId="1076"/>
+          <ac:spMkLst>
+            <pc:docMk/>
+            <pc:sldMk cId="920679095" sldId="256"/>
+            <ac:spMk id="8" creationId="{7581FB3C-97C9-5443-CC30-8B420074C7B8}"/>
+          </ac:spMkLst>
+        </pc:spChg>
+        <pc:spChg chg="mod">
+          <ac:chgData name="글론 닥터" userId="b0cac3566cd76970" providerId="LiveId" clId="{F28ECF3E-4BC1-52CB-8BC1-C40AAE8EC184}" dt="2025-08-26T13:12:10.452" v="1" actId="1076"/>
+          <ac:spMkLst>
+            <pc:docMk/>
+            <pc:sldMk cId="920679095" sldId="256"/>
+            <ac:spMk id="9" creationId="{4E1B07CA-7C74-0BD8-5DE7-05E1AD02B77D}"/>
+          </ac:spMkLst>
+        </pc:spChg>
+      </pc:sldChg>
+      <pc:sldChg chg="modSp mod">
+        <pc:chgData name="글론 닥터" userId="b0cac3566cd76970" providerId="LiveId" clId="{F28ECF3E-4BC1-52CB-8BC1-C40AAE8EC184}" dt="2025-08-26T13:16:32.524" v="15" actId="20577"/>
+        <pc:sldMkLst>
+          <pc:docMk/>
+          <pc:sldMk cId="3202891832" sldId="257"/>
+        </pc:sldMkLst>
+        <pc:spChg chg="mod">
+          <ac:chgData name="글론 닥터" userId="b0cac3566cd76970" providerId="LiveId" clId="{F28ECF3E-4BC1-52CB-8BC1-C40AAE8EC184}" dt="2025-08-26T13:16:32.524" v="15" actId="20577"/>
+          <ac:spMkLst>
+            <pc:docMk/>
+            <pc:sldMk cId="3202891832" sldId="257"/>
+            <ac:spMk id="10" creationId="{02AF8358-3A9A-C1EF-220B-A03F6EC1B1CC}"/>
+          </ac:spMkLst>
+        </pc:spChg>
+      </pc:sldChg>
+    </pc:docChg>
+  </pc:docChgLst>
+</pc:chgInfo>
 </file>
 
 <file path=ppt/slideLayouts/slideLayout1.xml><?xml version="1.0" encoding="utf-8"?>
@@ -3338,7 +3419,7 @@
         <p:spPr>
           <a:xfrm>
             <a:off x="1211283" y="855023"/>
-            <a:ext cx="5676405" cy="3360717"/>
+            <a:ext cx="6899564" cy="4120738"/>
           </a:xfrm>
           <a:prstGeom prst="frame">
             <a:avLst/>
@@ -3387,8 +3468,8 @@
         </p:nvSpPr>
         <p:spPr>
           <a:xfrm>
-            <a:off x="6980711" y="855022"/>
-            <a:ext cx="4467102" cy="5403274"/>
+            <a:off x="8263247" y="855022"/>
+            <a:ext cx="3184566" cy="5403274"/>
           </a:xfrm>
           <a:prstGeom prst="frame">
             <a:avLst/>
@@ -3437,8 +3518,8 @@
         </p:nvSpPr>
         <p:spPr>
           <a:xfrm>
-            <a:off x="1211282" y="4332514"/>
-            <a:ext cx="5676405" cy="1925782"/>
+            <a:off x="1211282" y="5110738"/>
+            <a:ext cx="6899564" cy="1147557"/>
           </a:xfrm>
           <a:prstGeom prst="frame">
             <a:avLst/>
@@ -3526,8 +3607,8 @@
         </p:nvSpPr>
         <p:spPr>
           <a:xfrm>
-            <a:off x="8263247" y="2910328"/>
-            <a:ext cx="2187039" cy="369332"/>
+            <a:off x="9474530" y="3244334"/>
+            <a:ext cx="1058883" cy="369332"/>
           </a:xfrm>
           <a:prstGeom prst="rect">
             <a:avLst/>
@@ -3562,7 +3643,7 @@
         </p:nvSpPr>
         <p:spPr>
           <a:xfrm>
-            <a:off x="1822860" y="5110739"/>
+            <a:off x="1822860" y="5499850"/>
             <a:ext cx="4453247" cy="369332"/>
           </a:xfrm>
           <a:prstGeom prst="rect">
@@ -3811,7 +3892,7 @@
           <a:p>
             <a:r>
               <a:rPr kumimoji="1" lang="ko-KR" altLang="en-US" dirty="0"/>
-              <a:t>선생님용 페이지</a:t>
+              <a:t>모니터 페이지</a:t>
             </a:r>
           </a:p>
         </p:txBody>

</xml_diff>